<commit_message>
Sync 18-01-12 18:22:12 UTC+0 @SP3
</commit_message>
<xml_diff>
--- a/Slides/Lisp Part Slides.pptx
+++ b/Slides/Lisp Part Slides.pptx
@@ -5,7 +5,7 @@
     <p:sldMasterId id="2147483660" r:id="rId1"/>
   </p:sldMasterIdLst>
   <p:notesMasterIdLst>
-    <p:notesMasterId r:id="rId22"/>
+    <p:notesMasterId r:id="rId24"/>
   </p:notesMasterIdLst>
   <p:sldIdLst>
     <p:sldId id="256" r:id="rId2"/>
@@ -27,7 +27,9 @@
     <p:sldId id="272" r:id="rId18"/>
     <p:sldId id="274" r:id="rId19"/>
     <p:sldId id="273" r:id="rId20"/>
-    <p:sldId id="275" r:id="rId21"/>
+    <p:sldId id="277" r:id="rId21"/>
+    <p:sldId id="275" r:id="rId22"/>
+    <p:sldId id="276" r:id="rId23"/>
   </p:sldIdLst>
   <p:sldSz cx="9144000" cy="6858000" type="screen4x3"/>
   <p:notesSz cx="6858000" cy="9144000"/>
@@ -150,13 +152,25 @@
             <p14:sldId id="272"/>
             <p14:sldId id="274"/>
             <p14:sldId id="273"/>
+            <p14:sldId id="277"/>
             <p14:sldId id="275"/>
+            <p14:sldId id="276"/>
           </p14:sldIdLst>
         </p14:section>
       </p14:sectionLst>
     </p:ext>
+    <p:ext uri="{EFAFB233-063F-42B5-8137-9DF3F51BA10A}">
+      <p15:sldGuideLst xmlns:p15="http://schemas.microsoft.com/office/powerpoint/2012/main"/>
+    </p:ext>
+    <p:ext uri="{2D200454-40CA-4A62-9FC3-DE9A4176ACB9}">
+      <p15:notesGuideLst xmlns:p15="http://schemas.microsoft.com/office/powerpoint/2012/main"/>
+    </p:ext>
   </p:extLst>
 </p:presentation>
+</file>
+
+<file path=ppt/revisionInfo.xml><?xml version="1.0" encoding="utf-8"?>
+<p1510:revInfo xmlns:a="http://schemas.openxmlformats.org/drawingml/2006/main" xmlns:r="http://schemas.openxmlformats.org/officeDocument/2006/relationships" xmlns:p1510="http://schemas.microsoft.com/office/powerpoint/2015/10/main"/>
 </file>
 
 <file path=ppt/notesMasters/notesMaster1.xml><?xml version="1.0" encoding="utf-8"?>
@@ -241,7 +255,7 @@
           <a:p>
             <a:fld id="{09F696EA-D01F-43A1-AAA2-411C4E4F97C4}" type="datetimeFigureOut">
               <a:rPr lang="en-US" smtClean="0"/>
-              <a:t>1/12/2018</a:t>
+              <a:t>1/13/2018</a:t>
             </a:fld>
             <a:endParaRPr lang="en-US"/>
           </a:p>
@@ -1048,7 +1062,7 @@
           <a:p>
             <a:fld id="{829C8869-4061-441D-9CD2-2A4B47B07150}" type="datetimeFigureOut">
               <a:rPr lang="en-US" smtClean="0"/>
-              <a:t>1/12/2018</a:t>
+              <a:t>1/13/2018</a:t>
             </a:fld>
             <a:endParaRPr lang="en-US"/>
           </a:p>
@@ -1218,7 +1232,7 @@
           <a:p>
             <a:fld id="{829C8869-4061-441D-9CD2-2A4B47B07150}" type="datetimeFigureOut">
               <a:rPr lang="en-US" smtClean="0"/>
-              <a:t>1/12/2018</a:t>
+              <a:t>1/13/2018</a:t>
             </a:fld>
             <a:endParaRPr lang="en-US"/>
           </a:p>
@@ -1398,7 +1412,7 @@
           <a:p>
             <a:fld id="{829C8869-4061-441D-9CD2-2A4B47B07150}" type="datetimeFigureOut">
               <a:rPr lang="en-US" smtClean="0"/>
-              <a:t>1/12/2018</a:t>
+              <a:t>1/13/2018</a:t>
             </a:fld>
             <a:endParaRPr lang="en-US"/>
           </a:p>
@@ -1568,7 +1582,7 @@
           <a:p>
             <a:fld id="{829C8869-4061-441D-9CD2-2A4B47B07150}" type="datetimeFigureOut">
               <a:rPr lang="en-US" smtClean="0"/>
-              <a:t>1/12/2018</a:t>
+              <a:t>1/13/2018</a:t>
             </a:fld>
             <a:endParaRPr lang="en-US"/>
           </a:p>
@@ -1812,7 +1826,7 @@
           <a:p>
             <a:fld id="{829C8869-4061-441D-9CD2-2A4B47B07150}" type="datetimeFigureOut">
               <a:rPr lang="en-US" smtClean="0"/>
-              <a:t>1/12/2018</a:t>
+              <a:t>1/13/2018</a:t>
             </a:fld>
             <a:endParaRPr lang="en-US"/>
           </a:p>
@@ -2044,7 +2058,7 @@
           <a:p>
             <a:fld id="{829C8869-4061-441D-9CD2-2A4B47B07150}" type="datetimeFigureOut">
               <a:rPr lang="en-US" smtClean="0"/>
-              <a:t>1/12/2018</a:t>
+              <a:t>1/13/2018</a:t>
             </a:fld>
             <a:endParaRPr lang="en-US"/>
           </a:p>
@@ -2411,7 +2425,7 @@
           <a:p>
             <a:fld id="{829C8869-4061-441D-9CD2-2A4B47B07150}" type="datetimeFigureOut">
               <a:rPr lang="en-US" smtClean="0"/>
-              <a:t>1/12/2018</a:t>
+              <a:t>1/13/2018</a:t>
             </a:fld>
             <a:endParaRPr lang="en-US"/>
           </a:p>
@@ -2529,7 +2543,7 @@
           <a:p>
             <a:fld id="{829C8869-4061-441D-9CD2-2A4B47B07150}" type="datetimeFigureOut">
               <a:rPr lang="en-US" smtClean="0"/>
-              <a:t>1/12/2018</a:t>
+              <a:t>1/13/2018</a:t>
             </a:fld>
             <a:endParaRPr lang="en-US"/>
           </a:p>
@@ -2624,7 +2638,7 @@
           <a:p>
             <a:fld id="{829C8869-4061-441D-9CD2-2A4B47B07150}" type="datetimeFigureOut">
               <a:rPr lang="en-US" smtClean="0"/>
-              <a:t>1/12/2018</a:t>
+              <a:t>1/13/2018</a:t>
             </a:fld>
             <a:endParaRPr lang="en-US"/>
           </a:p>
@@ -2901,7 +2915,7 @@
           <a:p>
             <a:fld id="{829C8869-4061-441D-9CD2-2A4B47B07150}" type="datetimeFigureOut">
               <a:rPr lang="en-US" smtClean="0"/>
-              <a:t>1/12/2018</a:t>
+              <a:t>1/13/2018</a:t>
             </a:fld>
             <a:endParaRPr lang="en-US"/>
           </a:p>
@@ -3158,7 +3172,7 @@
           <a:p>
             <a:fld id="{829C8869-4061-441D-9CD2-2A4B47B07150}" type="datetimeFigureOut">
               <a:rPr lang="en-US" smtClean="0"/>
-              <a:t>1/12/2018</a:t>
+              <a:t>1/13/2018</a:t>
             </a:fld>
             <a:endParaRPr lang="en-US"/>
           </a:p>
@@ -3371,7 +3385,7 @@
           <a:p>
             <a:fld id="{829C8869-4061-441D-9CD2-2A4B47B07150}" type="datetimeFigureOut">
               <a:rPr lang="en-US" smtClean="0"/>
-              <a:t>1/12/2018</a:t>
+              <a:t>1/13/2018</a:t>
             </a:fld>
             <a:endParaRPr lang="en-US"/>
           </a:p>
@@ -5436,6 +5450,533 @@
           <p:cNvPr id="2" name="标题 1">
             <a:extLst>
               <a:ext uri="{FF2B5EF4-FFF2-40B4-BE49-F238E27FC236}">
+                <a16:creationId xmlns:a16="http://schemas.microsoft.com/office/drawing/2014/main" id="{22936FDA-829F-4746-A367-0D6213A80A98}"/>
+              </a:ext>
+            </a:extLst>
+          </p:cNvPr>
+          <p:cNvSpPr>
+            <a:spLocks noGrp="1"/>
+          </p:cNvSpPr>
+          <p:nvPr>
+            <p:ph type="title"/>
+          </p:nvPr>
+        </p:nvSpPr>
+        <p:spPr/>
+        <p:txBody>
+          <a:bodyPr/>
+          <a:lstStyle/>
+          <a:p>
+            <a:r>
+              <a:rPr lang="zh-CN" altLang="en-US" dirty="0"/>
+              <a:t>例子：</a:t>
+            </a:r>
+            <a:r>
+              <a:rPr lang="en-US" altLang="zh-CN" dirty="0"/>
+              <a:t> list comprehensions</a:t>
+            </a:r>
+            <a:endParaRPr lang="en-US" dirty="0"/>
+          </a:p>
+        </p:txBody>
+      </p:sp>
+      <p:pic>
+        <p:nvPicPr>
+          <p:cNvPr id="4" name="内容占位符 3">
+            <a:extLst>
+              <a:ext uri="{FF2B5EF4-FFF2-40B4-BE49-F238E27FC236}">
+                <a16:creationId xmlns:a16="http://schemas.microsoft.com/office/drawing/2014/main" id="{8A5BC443-169A-4046-AD5E-0F1F419D4497}"/>
+              </a:ext>
+            </a:extLst>
+          </p:cNvPr>
+          <p:cNvPicPr>
+            <a:picLocks noGrp="1" noChangeAspect="1"/>
+          </p:cNvPicPr>
+          <p:nvPr>
+            <p:ph idx="1"/>
+          </p:nvPr>
+        </p:nvPicPr>
+        <p:blipFill>
+          <a:blip r:embed="rId2"/>
+          <a:stretch>
+            <a:fillRect/>
+          </a:stretch>
+        </p:blipFill>
+        <p:spPr>
+          <a:xfrm>
+            <a:off x="-7798" y="1629495"/>
+            <a:ext cx="9159596" cy="5186940"/>
+          </a:xfrm>
+          <a:prstGeom prst="rect">
+            <a:avLst/>
+          </a:prstGeom>
+        </p:spPr>
+      </p:pic>
+      <p:sp>
+        <p:nvSpPr>
+          <p:cNvPr id="5" name="矩形 4">
+            <a:extLst>
+              <a:ext uri="{FF2B5EF4-FFF2-40B4-BE49-F238E27FC236}">
+                <a16:creationId xmlns:a16="http://schemas.microsoft.com/office/drawing/2014/main" id="{724E2BAF-BBD9-4F4F-A3ED-C47C4301C6E3}"/>
+              </a:ext>
+            </a:extLst>
+          </p:cNvPr>
+          <p:cNvSpPr/>
+          <p:nvPr/>
+        </p:nvSpPr>
+        <p:spPr>
+          <a:xfrm>
+            <a:off x="668866" y="3205584"/>
+            <a:ext cx="139699" cy="193783"/>
+          </a:xfrm>
+          <a:prstGeom prst="rect">
+            <a:avLst/>
+          </a:prstGeom>
+          <a:solidFill>
+            <a:srgbClr val="FFFF00">
+              <a:alpha val="30000"/>
+            </a:srgbClr>
+          </a:solidFill>
+          <a:ln w="38100">
+            <a:solidFill>
+              <a:srgbClr val="FFFF00"/>
+            </a:solidFill>
+          </a:ln>
+        </p:spPr>
+        <p:style>
+          <a:lnRef idx="0">
+            <a:scrgbClr r="0" g="0" b="0"/>
+          </a:lnRef>
+          <a:fillRef idx="0">
+            <a:scrgbClr r="0" g="0" b="0"/>
+          </a:fillRef>
+          <a:effectRef idx="0">
+            <a:scrgbClr r="0" g="0" b="0"/>
+          </a:effectRef>
+          <a:fontRef idx="minor">
+            <a:schemeClr val="lt1"/>
+          </a:fontRef>
+        </p:style>
+        <p:txBody>
+          <a:bodyPr rtlCol="0" anchor="ctr"/>
+          <a:lstStyle/>
+          <a:p>
+            <a:pPr algn="ctr"/>
+            <a:endParaRPr lang="en-US"/>
+          </a:p>
+        </p:txBody>
+      </p:sp>
+      <p:sp>
+        <p:nvSpPr>
+          <p:cNvPr id="6" name="矩形 5">
+            <a:extLst>
+              <a:ext uri="{FF2B5EF4-FFF2-40B4-BE49-F238E27FC236}">
+                <a16:creationId xmlns:a16="http://schemas.microsoft.com/office/drawing/2014/main" id="{27CB0B8A-B5AA-4E6A-A683-CA7912B487FF}"/>
+              </a:ext>
+            </a:extLst>
+          </p:cNvPr>
+          <p:cNvSpPr/>
+          <p:nvPr/>
+        </p:nvSpPr>
+        <p:spPr>
+          <a:xfrm>
+            <a:off x="1466426" y="5003904"/>
+            <a:ext cx="139699" cy="193783"/>
+          </a:xfrm>
+          <a:prstGeom prst="rect">
+            <a:avLst/>
+          </a:prstGeom>
+          <a:solidFill>
+            <a:srgbClr val="FFFF00">
+              <a:alpha val="30000"/>
+            </a:srgbClr>
+          </a:solidFill>
+          <a:ln w="38100">
+            <a:solidFill>
+              <a:srgbClr val="FFFF00"/>
+            </a:solidFill>
+          </a:ln>
+        </p:spPr>
+        <p:style>
+          <a:lnRef idx="0">
+            <a:scrgbClr r="0" g="0" b="0"/>
+          </a:lnRef>
+          <a:fillRef idx="0">
+            <a:scrgbClr r="0" g="0" b="0"/>
+          </a:fillRef>
+          <a:effectRef idx="0">
+            <a:scrgbClr r="0" g="0" b="0"/>
+          </a:effectRef>
+          <a:fontRef idx="minor">
+            <a:schemeClr val="lt1"/>
+          </a:fontRef>
+        </p:style>
+        <p:txBody>
+          <a:bodyPr rtlCol="0" anchor="ctr"/>
+          <a:lstStyle/>
+          <a:p>
+            <a:pPr algn="ctr"/>
+            <a:endParaRPr lang="en-US"/>
+          </a:p>
+        </p:txBody>
+      </p:sp>
+      <p:sp>
+        <p:nvSpPr>
+          <p:cNvPr id="7" name="矩形 6">
+            <a:extLst>
+              <a:ext uri="{FF2B5EF4-FFF2-40B4-BE49-F238E27FC236}">
+                <a16:creationId xmlns:a16="http://schemas.microsoft.com/office/drawing/2014/main" id="{B3EE2C1D-94A7-48E3-A18F-0A068ABD3169}"/>
+              </a:ext>
+            </a:extLst>
+          </p:cNvPr>
+          <p:cNvSpPr/>
+          <p:nvPr/>
+        </p:nvSpPr>
+        <p:spPr>
+          <a:xfrm>
+            <a:off x="2761826" y="4998824"/>
+            <a:ext cx="139699" cy="193783"/>
+          </a:xfrm>
+          <a:prstGeom prst="rect">
+            <a:avLst/>
+          </a:prstGeom>
+          <a:solidFill>
+            <a:srgbClr val="FFFF00">
+              <a:alpha val="30000"/>
+            </a:srgbClr>
+          </a:solidFill>
+          <a:ln w="38100">
+            <a:solidFill>
+              <a:srgbClr val="FFFF00"/>
+            </a:solidFill>
+          </a:ln>
+        </p:spPr>
+        <p:style>
+          <a:lnRef idx="0">
+            <a:scrgbClr r="0" g="0" b="0"/>
+          </a:lnRef>
+          <a:fillRef idx="0">
+            <a:scrgbClr r="0" g="0" b="0"/>
+          </a:fillRef>
+          <a:effectRef idx="0">
+            <a:scrgbClr r="0" g="0" b="0"/>
+          </a:effectRef>
+          <a:fontRef idx="minor">
+            <a:schemeClr val="lt1"/>
+          </a:fontRef>
+        </p:style>
+        <p:txBody>
+          <a:bodyPr rtlCol="0" anchor="ctr"/>
+          <a:lstStyle/>
+          <a:p>
+            <a:pPr algn="ctr"/>
+            <a:endParaRPr lang="en-US"/>
+          </a:p>
+        </p:txBody>
+      </p:sp>
+      <p:sp>
+        <p:nvSpPr>
+          <p:cNvPr id="8" name="矩形 7">
+            <a:extLst>
+              <a:ext uri="{FF2B5EF4-FFF2-40B4-BE49-F238E27FC236}">
+                <a16:creationId xmlns:a16="http://schemas.microsoft.com/office/drawing/2014/main" id="{808EE3CD-6588-44F0-A457-820601EEF3B3}"/>
+              </a:ext>
+            </a:extLst>
+          </p:cNvPr>
+          <p:cNvSpPr/>
+          <p:nvPr/>
+        </p:nvSpPr>
+        <p:spPr>
+          <a:xfrm>
+            <a:off x="1969346" y="4145384"/>
+            <a:ext cx="139699" cy="193783"/>
+          </a:xfrm>
+          <a:prstGeom prst="rect">
+            <a:avLst/>
+          </a:prstGeom>
+          <a:solidFill>
+            <a:srgbClr val="FFFF00">
+              <a:alpha val="30000"/>
+            </a:srgbClr>
+          </a:solidFill>
+          <a:ln w="38100">
+            <a:solidFill>
+              <a:srgbClr val="FFFF00"/>
+            </a:solidFill>
+          </a:ln>
+        </p:spPr>
+        <p:style>
+          <a:lnRef idx="0">
+            <a:scrgbClr r="0" g="0" b="0"/>
+          </a:lnRef>
+          <a:fillRef idx="0">
+            <a:scrgbClr r="0" g="0" b="0"/>
+          </a:fillRef>
+          <a:effectRef idx="0">
+            <a:scrgbClr r="0" g="0" b="0"/>
+          </a:effectRef>
+          <a:fontRef idx="minor">
+            <a:schemeClr val="lt1"/>
+          </a:fontRef>
+        </p:style>
+        <p:txBody>
+          <a:bodyPr rtlCol="0" anchor="ctr"/>
+          <a:lstStyle/>
+          <a:p>
+            <a:pPr algn="ctr"/>
+            <a:endParaRPr lang="en-US"/>
+          </a:p>
+        </p:txBody>
+      </p:sp>
+      <p:sp>
+        <p:nvSpPr>
+          <p:cNvPr id="9" name="矩形 8">
+            <a:extLst>
+              <a:ext uri="{FF2B5EF4-FFF2-40B4-BE49-F238E27FC236}">
+                <a16:creationId xmlns:a16="http://schemas.microsoft.com/office/drawing/2014/main" id="{1D3EAA5C-CACB-4301-8362-F866D25CBB91}"/>
+              </a:ext>
+            </a:extLst>
+          </p:cNvPr>
+          <p:cNvSpPr/>
+          <p:nvPr/>
+        </p:nvSpPr>
+        <p:spPr>
+          <a:xfrm>
+            <a:off x="2370666" y="5842104"/>
+            <a:ext cx="139699" cy="193783"/>
+          </a:xfrm>
+          <a:prstGeom prst="rect">
+            <a:avLst/>
+          </a:prstGeom>
+          <a:solidFill>
+            <a:srgbClr val="FFFF00">
+              <a:alpha val="30000"/>
+            </a:srgbClr>
+          </a:solidFill>
+          <a:ln w="38100">
+            <a:solidFill>
+              <a:srgbClr val="FFFF00"/>
+            </a:solidFill>
+          </a:ln>
+        </p:spPr>
+        <p:style>
+          <a:lnRef idx="0">
+            <a:scrgbClr r="0" g="0" b="0"/>
+          </a:lnRef>
+          <a:fillRef idx="0">
+            <a:scrgbClr r="0" g="0" b="0"/>
+          </a:fillRef>
+          <a:effectRef idx="0">
+            <a:scrgbClr r="0" g="0" b="0"/>
+          </a:effectRef>
+          <a:fontRef idx="minor">
+            <a:schemeClr val="lt1"/>
+          </a:fontRef>
+        </p:style>
+        <p:txBody>
+          <a:bodyPr rtlCol="0" anchor="ctr"/>
+          <a:lstStyle/>
+          <a:p>
+            <a:pPr algn="ctr"/>
+            <a:endParaRPr lang="en-US"/>
+          </a:p>
+        </p:txBody>
+      </p:sp>
+      <p:sp>
+        <p:nvSpPr>
+          <p:cNvPr id="10" name="矩形 9">
+            <a:extLst>
+              <a:ext uri="{FF2B5EF4-FFF2-40B4-BE49-F238E27FC236}">
+                <a16:creationId xmlns:a16="http://schemas.microsoft.com/office/drawing/2014/main" id="{811265C9-5032-4082-AE62-E0978ECD8588}"/>
+              </a:ext>
+            </a:extLst>
+          </p:cNvPr>
+          <p:cNvSpPr/>
+          <p:nvPr/>
+        </p:nvSpPr>
+        <p:spPr>
+          <a:xfrm>
+            <a:off x="3960706" y="5857344"/>
+            <a:ext cx="139699" cy="193783"/>
+          </a:xfrm>
+          <a:prstGeom prst="rect">
+            <a:avLst/>
+          </a:prstGeom>
+          <a:solidFill>
+            <a:srgbClr val="FFFF00">
+              <a:alpha val="30000"/>
+            </a:srgbClr>
+          </a:solidFill>
+          <a:ln w="38100">
+            <a:solidFill>
+              <a:srgbClr val="FFFF00"/>
+            </a:solidFill>
+          </a:ln>
+        </p:spPr>
+        <p:style>
+          <a:lnRef idx="0">
+            <a:scrgbClr r="0" g="0" b="0"/>
+          </a:lnRef>
+          <a:fillRef idx="0">
+            <a:scrgbClr r="0" g="0" b="0"/>
+          </a:fillRef>
+          <a:effectRef idx="0">
+            <a:scrgbClr r="0" g="0" b="0"/>
+          </a:effectRef>
+          <a:fontRef idx="minor">
+            <a:schemeClr val="lt1"/>
+          </a:fontRef>
+        </p:style>
+        <p:txBody>
+          <a:bodyPr rtlCol="0" anchor="ctr"/>
+          <a:lstStyle/>
+          <a:p>
+            <a:pPr algn="ctr"/>
+            <a:endParaRPr lang="en-US"/>
+          </a:p>
+        </p:txBody>
+      </p:sp>
+      <p:sp>
+        <p:nvSpPr>
+          <p:cNvPr id="11" name="矩形 10">
+            <a:extLst>
+              <a:ext uri="{FF2B5EF4-FFF2-40B4-BE49-F238E27FC236}">
+                <a16:creationId xmlns:a16="http://schemas.microsoft.com/office/drawing/2014/main" id="{49AA0738-513F-410A-9EE0-048B430A44E2}"/>
+              </a:ext>
+            </a:extLst>
+          </p:cNvPr>
+          <p:cNvSpPr/>
+          <p:nvPr/>
+        </p:nvSpPr>
+        <p:spPr>
+          <a:xfrm>
+            <a:off x="5367866" y="5857344"/>
+            <a:ext cx="139699" cy="193783"/>
+          </a:xfrm>
+          <a:prstGeom prst="rect">
+            <a:avLst/>
+          </a:prstGeom>
+          <a:solidFill>
+            <a:srgbClr val="FFFF00">
+              <a:alpha val="30000"/>
+            </a:srgbClr>
+          </a:solidFill>
+          <a:ln w="38100">
+            <a:solidFill>
+              <a:srgbClr val="FFFF00"/>
+            </a:solidFill>
+          </a:ln>
+        </p:spPr>
+        <p:style>
+          <a:lnRef idx="0">
+            <a:scrgbClr r="0" g="0" b="0"/>
+          </a:lnRef>
+          <a:fillRef idx="0">
+            <a:scrgbClr r="0" g="0" b="0"/>
+          </a:fillRef>
+          <a:effectRef idx="0">
+            <a:scrgbClr r="0" g="0" b="0"/>
+          </a:effectRef>
+          <a:fontRef idx="minor">
+            <a:schemeClr val="lt1"/>
+          </a:fontRef>
+        </p:style>
+        <p:txBody>
+          <a:bodyPr rtlCol="0" anchor="ctr"/>
+          <a:lstStyle/>
+          <a:p>
+            <a:pPr algn="ctr"/>
+            <a:endParaRPr lang="en-US"/>
+          </a:p>
+        </p:txBody>
+      </p:sp>
+      <p:sp>
+        <p:nvSpPr>
+          <p:cNvPr id="12" name="矩形 11">
+            <a:extLst>
+              <a:ext uri="{FF2B5EF4-FFF2-40B4-BE49-F238E27FC236}">
+                <a16:creationId xmlns:a16="http://schemas.microsoft.com/office/drawing/2014/main" id="{6DA909B8-4C32-4289-8DD2-413102AB6810}"/>
+              </a:ext>
+            </a:extLst>
+          </p:cNvPr>
+          <p:cNvSpPr/>
+          <p:nvPr/>
+        </p:nvSpPr>
+        <p:spPr>
+          <a:xfrm>
+            <a:off x="973666" y="6436464"/>
+            <a:ext cx="139699" cy="193783"/>
+          </a:xfrm>
+          <a:prstGeom prst="rect">
+            <a:avLst/>
+          </a:prstGeom>
+          <a:solidFill>
+            <a:srgbClr val="FFFF00">
+              <a:alpha val="30000"/>
+            </a:srgbClr>
+          </a:solidFill>
+          <a:ln w="38100">
+            <a:solidFill>
+              <a:srgbClr val="FFFF00"/>
+            </a:solidFill>
+          </a:ln>
+        </p:spPr>
+        <p:style>
+          <a:lnRef idx="0">
+            <a:scrgbClr r="0" g="0" b="0"/>
+          </a:lnRef>
+          <a:fillRef idx="0">
+            <a:scrgbClr r="0" g="0" b="0"/>
+          </a:fillRef>
+          <a:effectRef idx="0">
+            <a:scrgbClr r="0" g="0" b="0"/>
+          </a:effectRef>
+          <a:fontRef idx="minor">
+            <a:schemeClr val="lt1"/>
+          </a:fontRef>
+        </p:style>
+        <p:txBody>
+          <a:bodyPr rtlCol="0" anchor="ctr"/>
+          <a:lstStyle/>
+          <a:p>
+            <a:pPr algn="ctr"/>
+            <a:endParaRPr lang="en-US"/>
+          </a:p>
+        </p:txBody>
+      </p:sp>
+    </p:spTree>
+    <p:extLst>
+      <p:ext uri="{BB962C8B-B14F-4D97-AF65-F5344CB8AC3E}">
+        <p14:creationId xmlns:p14="http://schemas.microsoft.com/office/powerpoint/2010/main" val="3934664274"/>
+      </p:ext>
+    </p:extLst>
+  </p:cSld>
+  <p:clrMapOvr>
+    <a:masterClrMapping/>
+  </p:clrMapOvr>
+</p:sld>
+</file>
+
+<file path=ppt/slides/slide21.xml><?xml version="1.0" encoding="utf-8"?>
+<p:sld xmlns:a="http://schemas.openxmlformats.org/drawingml/2006/main" xmlns:r="http://schemas.openxmlformats.org/officeDocument/2006/relationships" xmlns:p="http://schemas.openxmlformats.org/presentationml/2006/main">
+  <p:cSld>
+    <p:spTree>
+      <p:nvGrpSpPr>
+        <p:cNvPr id="1" name=""/>
+        <p:cNvGrpSpPr/>
+        <p:nvPr/>
+      </p:nvGrpSpPr>
+      <p:grpSpPr>
+        <a:xfrm>
+          <a:off x="0" y="0"/>
+          <a:ext cx="0" cy="0"/>
+          <a:chOff x="0" y="0"/>
+          <a:chExt cx="0" cy="0"/>
+        </a:xfrm>
+      </p:grpSpPr>
+      <p:sp>
+        <p:nvSpPr>
+          <p:cNvPr id="2" name="标题 1">
+            <a:extLst>
+              <a:ext uri="{FF2B5EF4-FFF2-40B4-BE49-F238E27FC236}">
                 <a16:creationId xmlns:a16="http://schemas.microsoft.com/office/drawing/2014/main" id="{6A9AEA76-7756-4CAD-BD80-16FF31FDE6FE}"/>
               </a:ext>
             </a:extLst>
@@ -5487,7 +6028,7 @@
           <a:p>
             <a:r>
               <a:rPr lang="zh-CN" altLang="en-US" dirty="0"/>
-              <a:t>使用以下宏调用，可以达到与</a:t>
+              <a:t>使用以下宏调用，可以达到与之前</a:t>
             </a:r>
             <a:r>
               <a:rPr lang="en-US" altLang="zh-CN" dirty="0"/>
@@ -5535,6 +6076,513 @@
     <p:extLst>
       <p:ext uri="{BB962C8B-B14F-4D97-AF65-F5344CB8AC3E}">
         <p14:creationId xmlns:p14="http://schemas.microsoft.com/office/powerpoint/2010/main" val="1641806844"/>
+      </p:ext>
+    </p:extLst>
+  </p:cSld>
+  <p:clrMapOvr>
+    <a:masterClrMapping/>
+  </p:clrMapOvr>
+</p:sld>
+</file>
+
+<file path=ppt/slides/slide22.xml><?xml version="1.0" encoding="utf-8"?>
+<p:sld xmlns:a="http://schemas.openxmlformats.org/drawingml/2006/main" xmlns:r="http://schemas.openxmlformats.org/officeDocument/2006/relationships" xmlns:p="http://schemas.openxmlformats.org/presentationml/2006/main">
+  <p:cSld>
+    <p:spTree>
+      <p:nvGrpSpPr>
+        <p:cNvPr id="1" name=""/>
+        <p:cNvGrpSpPr/>
+        <p:nvPr/>
+      </p:nvGrpSpPr>
+      <p:grpSpPr>
+        <a:xfrm>
+          <a:off x="0" y="0"/>
+          <a:ext cx="0" cy="0"/>
+          <a:chOff x="0" y="0"/>
+          <a:chExt cx="0" cy="0"/>
+        </a:xfrm>
+      </p:grpSpPr>
+      <p:sp>
+        <p:nvSpPr>
+          <p:cNvPr id="2" name="标题 1">
+            <a:extLst>
+              <a:ext uri="{FF2B5EF4-FFF2-40B4-BE49-F238E27FC236}">
+                <a16:creationId xmlns:a16="http://schemas.microsoft.com/office/drawing/2014/main" id="{B4A3A035-7292-4946-AE43-2902C3F0AAAC}"/>
+              </a:ext>
+            </a:extLst>
+          </p:cNvPr>
+          <p:cNvSpPr>
+            <a:spLocks noGrp="1"/>
+          </p:cNvSpPr>
+          <p:nvPr>
+            <p:ph type="title"/>
+          </p:nvPr>
+        </p:nvSpPr>
+        <p:spPr/>
+        <p:txBody>
+          <a:bodyPr/>
+          <a:lstStyle/>
+          <a:p>
+            <a:r>
+              <a:rPr lang="zh-CN" altLang="en-US" b="1" dirty="0"/>
+              <a:t>示例：快速排序法</a:t>
+            </a:r>
+            <a:r>
+              <a:rPr lang="en-US" altLang="zh-CN" b="1" dirty="0"/>
+              <a:t>(</a:t>
+            </a:r>
+            <a:r>
+              <a:rPr lang="en-US" b="1" dirty="0"/>
+              <a:t>Quicksort)</a:t>
+            </a:r>
+          </a:p>
+        </p:txBody>
+      </p:sp>
+      <p:sp>
+        <p:nvSpPr>
+          <p:cNvPr id="3" name="内容占位符 2">
+            <a:extLst>
+              <a:ext uri="{FF2B5EF4-FFF2-40B4-BE49-F238E27FC236}">
+                <a16:creationId xmlns:a16="http://schemas.microsoft.com/office/drawing/2014/main" id="{03473AFF-9C6A-42FE-903F-41B6D25873C5}"/>
+              </a:ext>
+            </a:extLst>
+          </p:cNvPr>
+          <p:cNvSpPr>
+            <a:spLocks noGrp="1"/>
+          </p:cNvSpPr>
+          <p:nvPr>
+            <p:ph idx="1"/>
+          </p:nvPr>
+        </p:nvSpPr>
+        <p:spPr/>
+        <p:txBody>
+          <a:bodyPr/>
+          <a:lstStyle/>
+          <a:p>
+            <a:r>
+              <a:rPr lang="en-US" altLang="zh-CN" dirty="0"/>
+              <a:t>Lisp</a:t>
+            </a:r>
+            <a:r>
+              <a:rPr lang="zh-CN" altLang="en-US" dirty="0"/>
+              <a:t>本身重度依赖宏，许多常见的操作本身是宏。</a:t>
+            </a:r>
+            <a:endParaRPr lang="en-US" dirty="0"/>
+          </a:p>
+        </p:txBody>
+      </p:sp>
+      <p:pic>
+        <p:nvPicPr>
+          <p:cNvPr id="6" name="图片 5">
+            <a:extLst>
+              <a:ext uri="{FF2B5EF4-FFF2-40B4-BE49-F238E27FC236}">
+                <a16:creationId xmlns:a16="http://schemas.microsoft.com/office/drawing/2014/main" id="{F5100361-4EED-4F65-A13B-CF429B7A11DA}"/>
+              </a:ext>
+            </a:extLst>
+          </p:cNvPr>
+          <p:cNvPicPr>
+            <a:picLocks noChangeAspect="1"/>
+          </p:cNvPicPr>
+          <p:nvPr/>
+        </p:nvPicPr>
+        <p:blipFill>
+          <a:blip r:embed="rId2"/>
+          <a:stretch>
+            <a:fillRect/>
+          </a:stretch>
+        </p:blipFill>
+        <p:spPr>
+          <a:xfrm>
+            <a:off x="1506901" y="2362199"/>
+            <a:ext cx="6240803" cy="4260274"/>
+          </a:xfrm>
+          <a:prstGeom prst="rect">
+            <a:avLst/>
+          </a:prstGeom>
+        </p:spPr>
+      </p:pic>
+      <p:sp>
+        <p:nvSpPr>
+          <p:cNvPr id="7" name="矩形 6">
+            <a:extLst>
+              <a:ext uri="{FF2B5EF4-FFF2-40B4-BE49-F238E27FC236}">
+                <a16:creationId xmlns:a16="http://schemas.microsoft.com/office/drawing/2014/main" id="{99D3936E-BD94-48FF-91F2-46E8B4BD3E2E}"/>
+              </a:ext>
+            </a:extLst>
+          </p:cNvPr>
+          <p:cNvSpPr/>
+          <p:nvPr/>
+        </p:nvSpPr>
+        <p:spPr>
+          <a:xfrm>
+            <a:off x="2770717" y="4779818"/>
+            <a:ext cx="840316" cy="226100"/>
+          </a:xfrm>
+          <a:prstGeom prst="rect">
+            <a:avLst/>
+          </a:prstGeom>
+          <a:solidFill>
+            <a:srgbClr val="FFFF00">
+              <a:alpha val="30000"/>
+            </a:srgbClr>
+          </a:solidFill>
+          <a:ln w="38100">
+            <a:solidFill>
+              <a:srgbClr val="FFFF00"/>
+            </a:solidFill>
+          </a:ln>
+        </p:spPr>
+        <p:style>
+          <a:lnRef idx="0">
+            <a:scrgbClr r="0" g="0" b="0"/>
+          </a:lnRef>
+          <a:fillRef idx="0">
+            <a:scrgbClr r="0" g="0" b="0"/>
+          </a:fillRef>
+          <a:effectRef idx="0">
+            <a:scrgbClr r="0" g="0" b="0"/>
+          </a:effectRef>
+          <a:fontRef idx="minor">
+            <a:schemeClr val="lt1"/>
+          </a:fontRef>
+        </p:style>
+        <p:txBody>
+          <a:bodyPr rtlCol="0" anchor="ctr"/>
+          <a:lstStyle/>
+          <a:p>
+            <a:pPr algn="ctr"/>
+            <a:endParaRPr lang="en-US"/>
+          </a:p>
+        </p:txBody>
+      </p:sp>
+      <p:sp>
+        <p:nvSpPr>
+          <p:cNvPr id="8" name="矩形 7">
+            <a:extLst>
+              <a:ext uri="{FF2B5EF4-FFF2-40B4-BE49-F238E27FC236}">
+                <a16:creationId xmlns:a16="http://schemas.microsoft.com/office/drawing/2014/main" id="{3840F956-DFB7-4F5F-BFF3-977854ECFD95}"/>
+              </a:ext>
+            </a:extLst>
+          </p:cNvPr>
+          <p:cNvSpPr/>
+          <p:nvPr/>
+        </p:nvSpPr>
+        <p:spPr>
+          <a:xfrm>
+            <a:off x="2540000" y="4511003"/>
+            <a:ext cx="469900" cy="226100"/>
+          </a:xfrm>
+          <a:prstGeom prst="rect">
+            <a:avLst/>
+          </a:prstGeom>
+          <a:solidFill>
+            <a:srgbClr val="FFFF00">
+              <a:alpha val="30000"/>
+            </a:srgbClr>
+          </a:solidFill>
+          <a:ln w="38100">
+            <a:solidFill>
+              <a:srgbClr val="FFFF00"/>
+            </a:solidFill>
+          </a:ln>
+        </p:spPr>
+        <p:style>
+          <a:lnRef idx="0">
+            <a:scrgbClr r="0" g="0" b="0"/>
+          </a:lnRef>
+          <a:fillRef idx="0">
+            <a:scrgbClr r="0" g="0" b="0"/>
+          </a:fillRef>
+          <a:effectRef idx="0">
+            <a:scrgbClr r="0" g="0" b="0"/>
+          </a:effectRef>
+          <a:fontRef idx="minor">
+            <a:schemeClr val="lt1"/>
+          </a:fontRef>
+        </p:style>
+        <p:txBody>
+          <a:bodyPr rtlCol="0" anchor="ctr"/>
+          <a:lstStyle/>
+          <a:p>
+            <a:pPr algn="ctr"/>
+            <a:endParaRPr lang="en-US"/>
+          </a:p>
+        </p:txBody>
+      </p:sp>
+      <p:sp>
+        <p:nvSpPr>
+          <p:cNvPr id="9" name="矩形 8">
+            <a:extLst>
+              <a:ext uri="{FF2B5EF4-FFF2-40B4-BE49-F238E27FC236}">
+                <a16:creationId xmlns:a16="http://schemas.microsoft.com/office/drawing/2014/main" id="{8F4015C0-DFEC-4D1E-BEA1-9C9E69AC9182}"/>
+              </a:ext>
+            </a:extLst>
+          </p:cNvPr>
+          <p:cNvSpPr/>
+          <p:nvPr/>
+        </p:nvSpPr>
+        <p:spPr>
+          <a:xfrm>
+            <a:off x="2772833" y="5048636"/>
+            <a:ext cx="469900" cy="226100"/>
+          </a:xfrm>
+          <a:prstGeom prst="rect">
+            <a:avLst/>
+          </a:prstGeom>
+          <a:solidFill>
+            <a:srgbClr val="FFFF00">
+              <a:alpha val="30000"/>
+            </a:srgbClr>
+          </a:solidFill>
+          <a:ln w="38100">
+            <a:solidFill>
+              <a:srgbClr val="FFFF00"/>
+            </a:solidFill>
+          </a:ln>
+        </p:spPr>
+        <p:style>
+          <a:lnRef idx="0">
+            <a:scrgbClr r="0" g="0" b="0"/>
+          </a:lnRef>
+          <a:fillRef idx="0">
+            <a:scrgbClr r="0" g="0" b="0"/>
+          </a:fillRef>
+          <a:effectRef idx="0">
+            <a:scrgbClr r="0" g="0" b="0"/>
+          </a:effectRef>
+          <a:fontRef idx="minor">
+            <a:schemeClr val="lt1"/>
+          </a:fontRef>
+        </p:style>
+        <p:txBody>
+          <a:bodyPr rtlCol="0" anchor="ctr"/>
+          <a:lstStyle/>
+          <a:p>
+            <a:pPr algn="ctr"/>
+            <a:endParaRPr lang="en-US"/>
+          </a:p>
+        </p:txBody>
+      </p:sp>
+      <p:sp>
+        <p:nvSpPr>
+          <p:cNvPr id="10" name="矩形 9">
+            <a:extLst>
+              <a:ext uri="{FF2B5EF4-FFF2-40B4-BE49-F238E27FC236}">
+                <a16:creationId xmlns:a16="http://schemas.microsoft.com/office/drawing/2014/main" id="{7F19CF00-0A53-4F64-9903-30BC1457CA57}"/>
+              </a:ext>
+            </a:extLst>
+          </p:cNvPr>
+          <p:cNvSpPr/>
+          <p:nvPr/>
+        </p:nvSpPr>
+        <p:spPr>
+          <a:xfrm>
+            <a:off x="2777067" y="5308986"/>
+            <a:ext cx="469900" cy="226100"/>
+          </a:xfrm>
+          <a:prstGeom prst="rect">
+            <a:avLst/>
+          </a:prstGeom>
+          <a:solidFill>
+            <a:srgbClr val="FFFF00">
+              <a:alpha val="30000"/>
+            </a:srgbClr>
+          </a:solidFill>
+          <a:ln w="38100">
+            <a:solidFill>
+              <a:srgbClr val="FFFF00"/>
+            </a:solidFill>
+          </a:ln>
+        </p:spPr>
+        <p:style>
+          <a:lnRef idx="0">
+            <a:scrgbClr r="0" g="0" b="0"/>
+          </a:lnRef>
+          <a:fillRef idx="0">
+            <a:scrgbClr r="0" g="0" b="0"/>
+          </a:fillRef>
+          <a:effectRef idx="0">
+            <a:scrgbClr r="0" g="0" b="0"/>
+          </a:effectRef>
+          <a:fontRef idx="minor">
+            <a:schemeClr val="lt1"/>
+          </a:fontRef>
+        </p:style>
+        <p:txBody>
+          <a:bodyPr rtlCol="0" anchor="ctr"/>
+          <a:lstStyle/>
+          <a:p>
+            <a:pPr algn="ctr"/>
+            <a:endParaRPr lang="en-US"/>
+          </a:p>
+        </p:txBody>
+      </p:sp>
+      <p:sp>
+        <p:nvSpPr>
+          <p:cNvPr id="11" name="矩形 10">
+            <a:extLst>
+              <a:ext uri="{FF2B5EF4-FFF2-40B4-BE49-F238E27FC236}">
+                <a16:creationId xmlns:a16="http://schemas.microsoft.com/office/drawing/2014/main" id="{52DE96F0-9BE0-4F49-818A-DC72A17625B2}"/>
+              </a:ext>
+            </a:extLst>
+          </p:cNvPr>
+          <p:cNvSpPr/>
+          <p:nvPr/>
+        </p:nvSpPr>
+        <p:spPr>
+          <a:xfrm>
+            <a:off x="2302937" y="3718843"/>
+            <a:ext cx="626534" cy="226100"/>
+          </a:xfrm>
+          <a:prstGeom prst="rect">
+            <a:avLst/>
+          </a:prstGeom>
+          <a:solidFill>
+            <a:srgbClr val="FFFF00">
+              <a:alpha val="30000"/>
+            </a:srgbClr>
+          </a:solidFill>
+          <a:ln w="38100">
+            <a:solidFill>
+              <a:srgbClr val="FFFF00"/>
+            </a:solidFill>
+          </a:ln>
+        </p:spPr>
+        <p:style>
+          <a:lnRef idx="0">
+            <a:scrgbClr r="0" g="0" b="0"/>
+          </a:lnRef>
+          <a:fillRef idx="0">
+            <a:scrgbClr r="0" g="0" b="0"/>
+          </a:fillRef>
+          <a:effectRef idx="0">
+            <a:scrgbClr r="0" g="0" b="0"/>
+          </a:effectRef>
+          <a:fontRef idx="minor">
+            <a:schemeClr val="lt1"/>
+          </a:fontRef>
+        </p:style>
+        <p:txBody>
+          <a:bodyPr rtlCol="0" anchor="ctr"/>
+          <a:lstStyle/>
+          <a:p>
+            <a:pPr algn="ctr"/>
+            <a:endParaRPr lang="en-US"/>
+          </a:p>
+        </p:txBody>
+      </p:sp>
+      <p:sp>
+        <p:nvSpPr>
+          <p:cNvPr id="12" name="矩形 11">
+            <a:extLst>
+              <a:ext uri="{FF2B5EF4-FFF2-40B4-BE49-F238E27FC236}">
+                <a16:creationId xmlns:a16="http://schemas.microsoft.com/office/drawing/2014/main" id="{371D7C46-EC60-42E1-9973-5216440041BD}"/>
+              </a:ext>
+            </a:extLst>
+          </p:cNvPr>
+          <p:cNvSpPr/>
+          <p:nvPr/>
+        </p:nvSpPr>
+        <p:spPr>
+          <a:xfrm>
+            <a:off x="2534178" y="3988711"/>
+            <a:ext cx="626534" cy="226100"/>
+          </a:xfrm>
+          <a:prstGeom prst="rect">
+            <a:avLst/>
+          </a:prstGeom>
+          <a:solidFill>
+            <a:srgbClr val="FFFF00">
+              <a:alpha val="30000"/>
+            </a:srgbClr>
+          </a:solidFill>
+          <a:ln w="38100">
+            <a:solidFill>
+              <a:srgbClr val="FFFF00"/>
+            </a:solidFill>
+          </a:ln>
+        </p:spPr>
+        <p:style>
+          <a:lnRef idx="0">
+            <a:scrgbClr r="0" g="0" b="0"/>
+          </a:lnRef>
+          <a:fillRef idx="0">
+            <a:scrgbClr r="0" g="0" b="0"/>
+          </a:fillRef>
+          <a:effectRef idx="0">
+            <a:scrgbClr r="0" g="0" b="0"/>
+          </a:effectRef>
+          <a:fontRef idx="minor">
+            <a:schemeClr val="lt1"/>
+          </a:fontRef>
+        </p:style>
+        <p:txBody>
+          <a:bodyPr rtlCol="0" anchor="ctr"/>
+          <a:lstStyle/>
+          <a:p>
+            <a:pPr algn="ctr"/>
+            <a:endParaRPr lang="en-US"/>
+          </a:p>
+        </p:txBody>
+      </p:sp>
+      <p:sp>
+        <p:nvSpPr>
+          <p:cNvPr id="13" name="矩形 12">
+            <a:extLst>
+              <a:ext uri="{FF2B5EF4-FFF2-40B4-BE49-F238E27FC236}">
+                <a16:creationId xmlns:a16="http://schemas.microsoft.com/office/drawing/2014/main" id="{B8CB7459-4455-45E9-A6AA-CFC6D721CCFB}"/>
+              </a:ext>
+            </a:extLst>
+          </p:cNvPr>
+          <p:cNvSpPr/>
+          <p:nvPr/>
+        </p:nvSpPr>
+        <p:spPr>
+          <a:xfrm>
+            <a:off x="2538941" y="4253823"/>
+            <a:ext cx="626534" cy="226100"/>
+          </a:xfrm>
+          <a:prstGeom prst="rect">
+            <a:avLst/>
+          </a:prstGeom>
+          <a:solidFill>
+            <a:srgbClr val="FFFF00">
+              <a:alpha val="30000"/>
+            </a:srgbClr>
+          </a:solidFill>
+          <a:ln w="38100">
+            <a:solidFill>
+              <a:srgbClr val="FFFF00"/>
+            </a:solidFill>
+          </a:ln>
+        </p:spPr>
+        <p:style>
+          <a:lnRef idx="0">
+            <a:scrgbClr r="0" g="0" b="0"/>
+          </a:lnRef>
+          <a:fillRef idx="0">
+            <a:scrgbClr r="0" g="0" b="0"/>
+          </a:fillRef>
+          <a:effectRef idx="0">
+            <a:scrgbClr r="0" g="0" b="0"/>
+          </a:effectRef>
+          <a:fontRef idx="minor">
+            <a:schemeClr val="lt1"/>
+          </a:fontRef>
+        </p:style>
+        <p:txBody>
+          <a:bodyPr rtlCol="0" anchor="ctr"/>
+          <a:lstStyle/>
+          <a:p>
+            <a:pPr algn="ctr"/>
+            <a:endParaRPr lang="en-US"/>
+          </a:p>
+        </p:txBody>
+      </p:sp>
+    </p:spTree>
+    <p:extLst>
+      <p:ext uri="{BB962C8B-B14F-4D97-AF65-F5344CB8AC3E}">
+        <p14:creationId xmlns:p14="http://schemas.microsoft.com/office/powerpoint/2010/main" val="3951988566"/>
       </p:ext>
     </p:extLst>
   </p:cSld>
@@ -6459,8 +7507,8 @@
           </a:p>
         </p:txBody>
       </p:sp>
-      <mc:AlternateContent xmlns:mc="http://schemas.openxmlformats.org/markup-compatibility/2006">
-        <mc:Choice xmlns:a14="http://schemas.microsoft.com/office/drawing/2010/main" Requires="a14">
+      <mc:AlternateContent xmlns:mc="http://schemas.openxmlformats.org/markup-compatibility/2006" xmlns:a14="http://schemas.microsoft.com/office/drawing/2010/main">
+        <mc:Choice Requires="a14">
           <p:sp>
             <p:nvSpPr>
               <p:cNvPr id="3" name="内容占位符 2">
@@ -6705,7 +7753,7 @@
             </p:txBody>
           </p:sp>
         </mc:Choice>
-        <mc:Fallback>
+        <mc:Fallback xmlns="">
           <p:sp>
             <p:nvSpPr>
               <p:cNvPr id="3" name="内容占位符 2">

</xml_diff>